<commit_message>
change file title of slides of EBADE
</commit_message>
<xml_diff>
--- a/content/en/publication/J-2024CAIS/slide.pptx
+++ b/content/en/publication/J-2024CAIS/slide.pptx
@@ -283,7 +283,7 @@
           <a:p>
             <a:fld id="{72E1F47F-969D-4603-8108-9CC3076B5F51}" type="datetimeFigureOut">
               <a:rPr kumimoji="1" lang="ja-JP" altLang="en-US" smtClean="0"/>
-              <a:t>2024/1/1</a:t>
+              <a:t>2024/1/2</a:t>
             </a:fld>
             <a:endParaRPr kumimoji="1" lang="ja-JP" altLang="en-US"/>
           </a:p>
@@ -1212,7 +1212,7 @@
           <a:p>
             <a:fld id="{EC648C84-F384-4CDF-85F3-92ECED032CB2}" type="datetime4">
               <a:rPr lang="ja-JP" altLang="en-US" smtClean="0"/>
-              <a:t>2024年1月1日</a:t>
+              <a:t>2024年1月2日</a:t>
             </a:fld>
             <a:endParaRPr lang="ja-JP" altLang="en-US" dirty="0"/>
           </a:p>

</xml_diff>